<commit_message>
solving bugs of threading and finishing the integration of all files
</commit_message>
<xml_diff>
--- a/presentations/teste.pptx
+++ b/presentations/teste.pptx
@@ -3112,7 +3112,7 @@
               <a:defRPr sz="2200"/>
             </a:pPr>
             <a:r>
-              <a:t>Lebron the GOAT of NBA</a:t>
+              <a:t>Test</a:t>
             </a:r>
           </a:p>
         </p:txBody>
@@ -3142,7 +3142,7 @@
               <a:defRPr sz="1600"/>
             </a:pPr>
             <a:r>
-              <a:t>Lebron is considered for many the greatest basketball player of all time</a:t>
+              <a:t>Discussion on LeBron James being a top basketball player who has played for multiple teams and won titles during the pandemic bubble.</a:t>
             </a:r>
           </a:p>
           <a:p>
@@ -3150,7 +3150,15 @@
               <a:defRPr sz="1600"/>
             </a:pPr>
             <a:r>
-              <a:t>There people who compare him to Michael Jordan, but everyone knows who is the goat</a:t>
+              <a:t>Mention of his career including stints with Cleveland Cavaliers, Miami Heat, and current team LA Lakers.</a:t>
+            </a:r>
+          </a:p>
+          <a:p>
+            <a:pPr>
+              <a:defRPr sz="1600"/>
+            </a:pPr>
+            <a:r>
+              <a:t>Comparison with Jordan, asserting LeBron's greatness in basketball.</a:t>
             </a:r>
           </a:p>
         </p:txBody>

</xml_diff>

<commit_message>
drawing now is inserted into ppt and title is added to ppt based on the title gpt returned
</commit_message>
<xml_diff>
--- a/presentations/teste.pptx
+++ b/presentations/teste.pptx
@@ -3112,7 +3112,7 @@
               <a:defRPr sz="2200"/>
             </a:pPr>
             <a:r>
-              <a:t>Test</a:t>
+              <a:t>Basketball: A Brief Overview</a:t>
             </a:r>
           </a:p>
         </p:txBody>
@@ -3142,7 +3142,7 @@
               <a:defRPr sz="1600"/>
             </a:pPr>
             <a:r>
-              <a:t>Discussion on LeBron James being a top basketball player who has played for multiple teams and won titles during the pandemic bubble.</a:t>
+              <a:t>Basketball is a sport played 5v5 with the NBA being one of the most famous leagues globally.</a:t>
             </a:r>
           </a:p>
           <a:p>
@@ -3150,22 +3150,14 @@
               <a:defRPr sz="1600"/>
             </a:pPr>
             <a:r>
-              <a:t>Mention of his career including stints with Cleveland Cavaliers, Miami Heat, and current team LA Lakers.</a:t>
-            </a:r>
-          </a:p>
-          <a:p>
-            <a:pPr>
-              <a:defRPr sz="1600"/>
-            </a:pPr>
-            <a:r>
-              <a:t>Comparison with Jordan, asserting LeBron's greatness in basketball.</a:t>
+              <a:t>The NBA is the US National League of Basketball, featuring iconic players like Michael Jordan and LeBron James.</a:t>
             </a:r>
           </a:p>
         </p:txBody>
       </p:sp>
       <p:pic>
         <p:nvPicPr>
-          <p:cNvPr id="4" name="Picture 3" descr="lebron.jpg"/>
+          <p:cNvPr id="4" name="Picture 3" descr="drawing.jpg"/>
           <p:cNvPicPr>
             <a:picLocks noChangeAspect="1"/>
           </p:cNvPicPr>
@@ -3180,7 +3172,7 @@
         <p:spPr>
           <a:xfrm>
             <a:off x="5486400" y="1828800"/>
-            <a:ext cx="3017520" cy="2083551"/>
+            <a:ext cx="3017520" cy="1697355"/>
           </a:xfrm>
           <a:prstGeom prst="rect">
             <a:avLst/>

</xml_diff>